<commit_message>
Add GO x JWT
</commit_message>
<xml_diff>
--- a/Article/Note/2020_09_당근마켓/img/img.pptx
+++ b/Article/Note/2020_09_당근마켓/img/img.pptx
@@ -6,6 +6,7 @@
   </p:sldMasterIdLst>
   <p:sldIdLst>
     <p:sldId id="256" r:id="rId2"/>
+    <p:sldId id="257" r:id="rId3"/>
   </p:sldIdLst>
   <p:sldSz cx="12192000" cy="6858000"/>
   <p:notesSz cx="6858000" cy="9144000"/>
@@ -104,6 +105,11 @@
       </a:defRPr>
     </a:lvl9pPr>
   </p:defaultTextStyle>
+  <p:extLst>
+    <p:ext uri="{EFAFB233-063F-42B5-8137-9DF3F51BA10A}">
+      <p15:sldGuideLst xmlns:p15="http://schemas.microsoft.com/office/powerpoint/2012/main"/>
+    </p:ext>
+  </p:extLst>
 </p:presentation>
 </file>
 
@@ -3343,7 +3349,7 @@
         </p:blipFill>
         <p:spPr>
           <a:xfrm>
-            <a:off x="0" y="-231112"/>
+            <a:off x="251209" y="-233624"/>
             <a:ext cx="12192000" cy="6858000"/>
           </a:xfrm>
           <a:prstGeom prst="rect">
@@ -3407,6 +3413,217 @@
     <p:extLst>
       <p:ext uri="{BB962C8B-B14F-4D97-AF65-F5344CB8AC3E}">
         <p14:creationId xmlns:p14="http://schemas.microsoft.com/office/powerpoint/2010/main" val="2900273954"/>
+      </p:ext>
+    </p:extLst>
+  </p:cSld>
+  <p:clrMapOvr>
+    <a:masterClrMapping/>
+  </p:clrMapOvr>
+</p:sld>
+</file>
+
+<file path=ppt/slides/slide2.xml><?xml version="1.0" encoding="utf-8"?>
+<p:sld xmlns:a="http://schemas.openxmlformats.org/drawingml/2006/main" xmlns:r="http://schemas.openxmlformats.org/officeDocument/2006/relationships" xmlns:p="http://schemas.openxmlformats.org/presentationml/2006/main">
+  <p:cSld>
+    <p:spTree>
+      <p:nvGrpSpPr>
+        <p:cNvPr id="1" name=""/>
+        <p:cNvGrpSpPr/>
+        <p:nvPr/>
+      </p:nvGrpSpPr>
+      <p:grpSpPr>
+        <a:xfrm>
+          <a:off x="0" y="0"/>
+          <a:ext cx="0" cy="0"/>
+          <a:chOff x="0" y="0"/>
+          <a:chExt cx="0" cy="0"/>
+        </a:xfrm>
+      </p:grpSpPr>
+      <p:pic>
+        <p:nvPicPr>
+          <p:cNvPr id="1026" name="Picture 2" descr="당신 근처의 당근마켓">
+            <a:extLst>
+              <a:ext uri="{FF2B5EF4-FFF2-40B4-BE49-F238E27FC236}">
+                <a16:creationId xmlns:a16="http://schemas.microsoft.com/office/drawing/2014/main" id="{96360573-698A-4A99-A5F1-7C80413197AE}"/>
+              </a:ext>
+            </a:extLst>
+          </p:cNvPr>
+          <p:cNvPicPr>
+            <a:picLocks noChangeAspect="1" noChangeArrowheads="1"/>
+          </p:cNvPicPr>
+          <p:nvPr/>
+        </p:nvPicPr>
+        <p:blipFill>
+          <a:blip r:embed="rId2">
+            <a:extLst>
+              <a:ext uri="{28A0092B-C50C-407E-A947-70E740481C1C}">
+                <a14:useLocalDpi xmlns:a14="http://schemas.microsoft.com/office/drawing/2010/main" val="0"/>
+              </a:ext>
+            </a:extLst>
+          </a:blip>
+          <a:srcRect/>
+          <a:stretch>
+            <a:fillRect/>
+          </a:stretch>
+        </p:blipFill>
+        <p:spPr bwMode="auto">
+          <a:xfrm>
+            <a:off x="0" y="379413"/>
+            <a:ext cx="12192000" cy="6099175"/>
+          </a:xfrm>
+          <a:prstGeom prst="rect">
+            <a:avLst/>
+          </a:prstGeom>
+          <a:noFill/>
+          <a:extLst>
+            <a:ext uri="{909E8E84-426E-40DD-AFC4-6F175D3DCCD1}">
+              <a14:hiddenFill xmlns:a14="http://schemas.microsoft.com/office/drawing/2010/main">
+                <a:solidFill>
+                  <a:srgbClr val="FFFFFF"/>
+                </a:solidFill>
+              </a14:hiddenFill>
+            </a:ext>
+          </a:extLst>
+        </p:spPr>
+      </p:pic>
+      <p:sp>
+        <p:nvSpPr>
+          <p:cNvPr id="4" name="직사각형 3">
+            <a:extLst>
+              <a:ext uri="{FF2B5EF4-FFF2-40B4-BE49-F238E27FC236}">
+                <a16:creationId xmlns:a16="http://schemas.microsoft.com/office/drawing/2014/main" id="{54BD0495-F401-4826-8B19-CAD4E7FA549E}"/>
+              </a:ext>
+            </a:extLst>
+          </p:cNvPr>
+          <p:cNvSpPr/>
+          <p:nvPr/>
+        </p:nvSpPr>
+        <p:spPr>
+          <a:xfrm>
+            <a:off x="1627833" y="2592475"/>
+            <a:ext cx="3547068" cy="1256044"/>
+          </a:xfrm>
+          <a:prstGeom prst="rect">
+            <a:avLst/>
+          </a:prstGeom>
+          <a:solidFill>
+            <a:srgbClr val="F8F5F4"/>
+          </a:solidFill>
+          <a:ln>
+            <a:noFill/>
+          </a:ln>
+        </p:spPr>
+        <p:style>
+          <a:lnRef idx="2">
+            <a:schemeClr val="accent1">
+              <a:shade val="50000"/>
+            </a:schemeClr>
+          </a:lnRef>
+          <a:fillRef idx="1">
+            <a:schemeClr val="accent1"/>
+          </a:fillRef>
+          <a:effectRef idx="0">
+            <a:schemeClr val="accent1"/>
+          </a:effectRef>
+          <a:fontRef idx="minor">
+            <a:schemeClr val="lt1"/>
+          </a:fontRef>
+        </p:style>
+        <p:txBody>
+          <a:bodyPr rtlCol="0" anchor="ctr"/>
+          <a:lstStyle/>
+          <a:p>
+            <a:pPr algn="ctr"/>
+            <a:endParaRPr lang="ko-KR" altLang="en-US"/>
+          </a:p>
+        </p:txBody>
+      </p:sp>
+      <p:sp>
+        <p:nvSpPr>
+          <p:cNvPr id="7" name="직사각형 6">
+            <a:extLst>
+              <a:ext uri="{FF2B5EF4-FFF2-40B4-BE49-F238E27FC236}">
+                <a16:creationId xmlns:a16="http://schemas.microsoft.com/office/drawing/2014/main" id="{2D506579-D3C5-425C-B45F-8747554539B9}"/>
+              </a:ext>
+            </a:extLst>
+          </p:cNvPr>
+          <p:cNvSpPr/>
+          <p:nvPr/>
+        </p:nvSpPr>
+        <p:spPr>
+          <a:xfrm>
+            <a:off x="5287317" y="2495584"/>
+            <a:ext cx="5534758" cy="1256044"/>
+          </a:xfrm>
+          <a:prstGeom prst="rect">
+            <a:avLst/>
+          </a:prstGeom>
+          <a:solidFill>
+            <a:srgbClr val="F8F5F4"/>
+          </a:solidFill>
+          <a:ln>
+            <a:noFill/>
+          </a:ln>
+        </p:spPr>
+        <p:style>
+          <a:lnRef idx="2">
+            <a:schemeClr val="accent1">
+              <a:shade val="50000"/>
+            </a:schemeClr>
+          </a:lnRef>
+          <a:fillRef idx="1">
+            <a:schemeClr val="accent1"/>
+          </a:fillRef>
+          <a:effectRef idx="0">
+            <a:schemeClr val="accent1"/>
+          </a:effectRef>
+          <a:fontRef idx="minor">
+            <a:schemeClr val="lt1"/>
+          </a:fontRef>
+        </p:style>
+        <p:txBody>
+          <a:bodyPr rtlCol="0" anchor="ctr"/>
+          <a:lstStyle/>
+          <a:p>
+            <a:pPr algn="ctr"/>
+            <a:endParaRPr lang="ko-KR" altLang="en-US"/>
+          </a:p>
+        </p:txBody>
+      </p:sp>
+      <p:pic>
+        <p:nvPicPr>
+          <p:cNvPr id="5" name="그림 4">
+            <a:extLst>
+              <a:ext uri="{FF2B5EF4-FFF2-40B4-BE49-F238E27FC236}">
+                <a16:creationId xmlns:a16="http://schemas.microsoft.com/office/drawing/2014/main" id="{B458D81B-C625-4E02-A120-9DC5C7F335B6}"/>
+              </a:ext>
+            </a:extLst>
+          </p:cNvPr>
+          <p:cNvPicPr>
+            <a:picLocks noChangeAspect="1"/>
+          </p:cNvPicPr>
+          <p:nvPr/>
+        </p:nvPicPr>
+        <p:blipFill>
+          <a:blip r:embed="rId3"/>
+          <a:stretch>
+            <a:fillRect/>
+          </a:stretch>
+        </p:blipFill>
+        <p:spPr>
+          <a:xfrm>
+            <a:off x="3917392" y="2433043"/>
+            <a:ext cx="4381500" cy="1381125"/>
+          </a:xfrm>
+          <a:prstGeom prst="rect">
+            <a:avLst/>
+          </a:prstGeom>
+        </p:spPr>
+      </p:pic>
+    </p:spTree>
+    <p:extLst>
+      <p:ext uri="{BB962C8B-B14F-4D97-AF65-F5344CB8AC3E}">
+        <p14:creationId xmlns:p14="http://schemas.microsoft.com/office/powerpoint/2010/main" val="701977213"/>
       </p:ext>
     </p:extLst>
   </p:cSld>

</xml_diff>